<commit_message>
First pass schedule for 2025
</commit_message>
<xml_diff>
--- a/PPT/Intro.pptx
+++ b/PPT/Intro.pptx
@@ -269,7 +269,7 @@
           <a:p>
             <a:fld id="{5578FD48-7BBA-4787-8980-5DFB65E0734D}" type="datetimeFigureOut">
               <a:rPr lang="en-US" smtClean="0"/>
-              <a:t>3/18/2024</a:t>
+              <a:t>1/19/2025</a:t>
             </a:fld>
             <a:endParaRPr lang="en-US"/>
           </a:p>
@@ -1231,7 +1231,7 @@
             <a:fld id="{1D8BD707-D9CF-40AE-B4C6-C98DA3205C09}" type="datetimeFigureOut">
               <a:rPr lang="en-US" smtClean="0"/>
               <a:pPr/>
-              <a:t>3/18/2024</a:t>
+              <a:t>1/19/2025</a:t>
             </a:fld>
             <a:endParaRPr lang="en-US"/>
           </a:p>
@@ -1548,7 +1548,7 @@
             <a:fld id="{1D8BD707-D9CF-40AE-B4C6-C98DA3205C09}" type="datetimeFigureOut">
               <a:rPr lang="en-US" smtClean="0"/>
               <a:pPr/>
-              <a:t>3/18/2024</a:t>
+              <a:t>1/19/2025</a:t>
             </a:fld>
             <a:endParaRPr lang="en-US"/>
           </a:p>
@@ -1724,7 +1724,7 @@
             <a:fld id="{1D8BD707-D9CF-40AE-B4C6-C98DA3205C09}" type="datetimeFigureOut">
               <a:rPr lang="en-US" smtClean="0"/>
               <a:pPr/>
-              <a:t>3/18/2024</a:t>
+              <a:t>1/19/2025</a:t>
             </a:fld>
             <a:endParaRPr lang="en-US"/>
           </a:p>
@@ -1844,7 +1844,7 @@
             <a:fld id="{1D8BD707-D9CF-40AE-B4C6-C98DA3205C09}" type="datetimeFigureOut">
               <a:rPr lang="en-US" smtClean="0"/>
               <a:pPr/>
-              <a:t>3/18/2024</a:t>
+              <a:t>1/19/2025</a:t>
             </a:fld>
             <a:endParaRPr lang="en-US"/>
           </a:p>
@@ -2144,7 +2144,7 @@
             <a:fld id="{1D8BD707-D9CF-40AE-B4C6-C98DA3205C09}" type="datetimeFigureOut">
               <a:rPr lang="en-US" smtClean="0"/>
               <a:pPr/>
-              <a:t>3/18/2024</a:t>
+              <a:t>1/19/2025</a:t>
             </a:fld>
             <a:endParaRPr lang="en-US"/>
           </a:p>
@@ -2439,7 +2439,7 @@
             <a:fld id="{1D8BD707-D9CF-40AE-B4C6-C98DA3205C09}" type="datetimeFigureOut">
               <a:rPr lang="en-US" smtClean="0"/>
               <a:pPr/>
-              <a:t>3/18/2024</a:t>
+              <a:t>1/19/2025</a:t>
             </a:fld>
             <a:endParaRPr lang="en-US"/>
           </a:p>
@@ -2869,7 +2869,7 @@
             <a:fld id="{1D8BD707-D9CF-40AE-B4C6-C98DA3205C09}" type="datetimeFigureOut">
               <a:rPr lang="en-US" smtClean="0"/>
               <a:pPr/>
-              <a:t>3/18/2024</a:t>
+              <a:t>1/19/2025</a:t>
             </a:fld>
             <a:endParaRPr lang="en-US"/>
           </a:p>
@@ -2989,7 +2989,7 @@
             <a:fld id="{1D8BD707-D9CF-40AE-B4C6-C98DA3205C09}" type="datetimeFigureOut">
               <a:rPr lang="en-US" smtClean="0"/>
               <a:pPr/>
-              <a:t>3/18/2024</a:t>
+              <a:t>1/19/2025</a:t>
             </a:fld>
             <a:endParaRPr lang="en-US"/>
           </a:p>
@@ -3081,7 +3081,7 @@
             <a:fld id="{1D8BD707-D9CF-40AE-B4C6-C98DA3205C09}" type="datetimeFigureOut">
               <a:rPr lang="en-US" smtClean="0"/>
               <a:pPr/>
-              <a:t>3/18/2024</a:t>
+              <a:t>1/19/2025</a:t>
             </a:fld>
             <a:endParaRPr lang="en-US"/>
           </a:p>
@@ -3333,7 +3333,7 @@
             <a:fld id="{1D8BD707-D9CF-40AE-B4C6-C98DA3205C09}" type="datetimeFigureOut">
               <a:rPr lang="en-US" smtClean="0"/>
               <a:pPr/>
-              <a:t>3/18/2024</a:t>
+              <a:t>1/19/2025</a:t>
             </a:fld>
             <a:endParaRPr lang="en-US"/>
           </a:p>
@@ -3851,7 +3851,7 @@
             <a:fld id="{1D8BD707-D9CF-40AE-B4C6-C98DA3205C09}" type="datetimeFigureOut">
               <a:rPr lang="en-US" smtClean="0"/>
               <a:pPr/>
-              <a:t>3/18/2024</a:t>
+              <a:t>1/19/2025</a:t>
             </a:fld>
             <a:endParaRPr lang="en-US"/>
           </a:p>
@@ -4083,7 +4083,7 @@
             <a:fld id="{1D8BD707-D9CF-40AE-B4C6-C98DA3205C09}" type="datetimeFigureOut">
               <a:rPr lang="en-US" smtClean="0"/>
               <a:pPr/>
-              <a:t>3/18/2024</a:t>
+              <a:t>1/19/2025</a:t>
             </a:fld>
             <a:endParaRPr lang="en-US"/>
           </a:p>
@@ -4627,7 +4627,7 @@
           <a:p>
             <a:r>
               <a:rPr lang="en-US" dirty="0"/>
-              <a:t>March 2024</a:t>
+              <a:t>March 2025</a:t>
             </a:r>
           </a:p>
         </p:txBody>
@@ -4742,7 +4742,7 @@
         </p:spPr>
         <p:txBody>
           <a:bodyPr>
-            <a:normAutofit/>
+            <a:normAutofit fontScale="92500" lnSpcReduction="10000"/>
           </a:bodyPr>
           <a:lstStyle/>
           <a:p>
@@ -4771,18 +4771,7 @@
                   <a:srgbClr val="FFFF00"/>
                 </a:solidFill>
               </a:rPr>
-              <a:t>From Teams of 5 or 6 members</a:t>
-            </a:r>
-            <a:endParaRPr lang="en-US" sz="1800" dirty="0">
-              <a:solidFill>
-                <a:srgbClr val="FFFF00"/>
-              </a:solidFill>
-            </a:endParaRPr>
-          </a:p>
-          <a:p>
-            <a:r>
-              <a:rPr lang="en-US" sz="1800" dirty="0"/>
-              <a:t>Weekend: Saturday and Sunday</a:t>
+              <a:t>From Teams of 4 members</a:t>
             </a:r>
           </a:p>
           <a:p>
@@ -4802,26 +4791,64 @@
           <a:p>
             <a:r>
               <a:rPr lang="en-US" sz="1800" dirty="0"/>
-              <a:t>Next week: Monday to Thursday: Build the </a:t>
-            </a:r>
-            <a:r>
-              <a:rPr lang="en-US" sz="1800" b="1" dirty="0">
-                <a:solidFill>
-                  <a:srgbClr val="FFFF00"/>
-                </a:solidFill>
-              </a:rPr>
-              <a:t>best game</a:t>
-            </a:r>
+              <a:t>Weekend: Saturday</a:t>
+            </a:r>
+          </a:p>
+          <a:p>
+            <a:pPr lvl="1"/>
             <a:r>
               <a:rPr lang="en-US" sz="1800" dirty="0"/>
-              <a:t> ever</a:t>
+              <a:t>Present your game design, convince us it is the best game ever</a:t>
+            </a:r>
+          </a:p>
+          <a:p>
+            <a:r>
+              <a:rPr lang="en-US" sz="1800" dirty="0"/>
+              <a:t>Next week: </a:t>
             </a:r>
           </a:p>
           <a:p>
             <a:pPr lvl="1"/>
             <a:r>
               <a:rPr lang="en-US" sz="1800" dirty="0"/>
-              <a:t>Present idea, show demo, we play your alpha, and we play your final game</a:t>
+              <a:t>Monday (10</a:t>
+            </a:r>
+            <a:r>
+              <a:rPr lang="en-US" sz="1800" baseline="30000" dirty="0"/>
+              <a:t>th</a:t>
+            </a:r>
+            <a:r>
+              <a:rPr lang="en-US" sz="1800" dirty="0"/>
+              <a:t> of March): Build a rough version of the game and show us</a:t>
+            </a:r>
+          </a:p>
+          <a:p>
+            <a:pPr lvl="1"/>
+            <a:r>
+              <a:rPr lang="en-US" sz="1800" dirty="0"/>
+              <a:t>Wednesday (12</a:t>
+            </a:r>
+            <a:r>
+              <a:rPr lang="en-US" sz="1800" baseline="30000" dirty="0"/>
+              <a:t>th</a:t>
+            </a:r>
+            <a:r>
+              <a:rPr lang="en-US" sz="1800" dirty="0"/>
+              <a:t> of March): We will play and critique your games!!</a:t>
+            </a:r>
+          </a:p>
+          <a:p>
+            <a:r>
+              <a:rPr lang="en-US" sz="1800" dirty="0"/>
+              <a:t>Two weeks later on 17</a:t>
+            </a:r>
+            <a:r>
+              <a:rPr lang="en-US" sz="1800" baseline="30000" dirty="0"/>
+              <a:t>th</a:t>
+            </a:r>
+            <a:r>
+              <a:rPr lang="en-US" sz="1800" dirty="0"/>
+              <a:t> of March: we will play and rank all games</a:t>
             </a:r>
           </a:p>
         </p:txBody>
@@ -4921,7 +4948,7 @@
                                         <p:tgtEl>
                                           <p:spTgt spid="3">
                                             <p:txEl>
-                                              <p:pRg st="3" end="3"/>
+                                              <p:pRg st="5" end="5"/>
                                             </p:txEl>
                                           </p:spTgt>
                                         </p:tgtEl>
@@ -4970,7 +4997,7 @@
                                         <p:tgtEl>
                                           <p:spTgt spid="3">
                                             <p:txEl>
-                                              <p:pRg st="6" end="6"/>
+                                              <p:pRg st="7" end="7"/>
                                             </p:txEl>
                                           </p:spTgt>
                                         </p:tgtEl>
@@ -5019,7 +5046,7 @@
                                         <p:tgtEl>
                                           <p:spTgt spid="3">
                                             <p:txEl>
-                                              <p:pRg st="1" end="1"/>
+                                              <p:pRg st="8" end="8"/>
                                             </p:txEl>
                                           </p:spTgt>
                                         </p:tgtEl>
@@ -5068,7 +5095,7 @@
                                         <p:tgtEl>
                                           <p:spTgt spid="3">
                                             <p:txEl>
-                                              <p:pRg st="2" end="2"/>
+                                              <p:pRg st="9" end="9"/>
                                             </p:txEl>
                                           </p:spTgt>
                                         </p:tgtEl>
@@ -5117,7 +5144,7 @@
                                         <p:tgtEl>
                                           <p:spTgt spid="3">
                                             <p:txEl>
-                                              <p:pRg st="4" end="4"/>
+                                              <p:pRg st="1" end="1"/>
                                             </p:txEl>
                                           </p:spTgt>
                                         </p:tgtEl>
@@ -5166,7 +5193,7 @@
                                         <p:tgtEl>
                                           <p:spTgt spid="3">
                                             <p:txEl>
-                                              <p:pRg st="5" end="5"/>
+                                              <p:pRg st="2" end="2"/>
                                             </p:txEl>
                                           </p:spTgt>
                                         </p:tgtEl>
@@ -5215,7 +5242,154 @@
                                         <p:tgtEl>
                                           <p:spTgt spid="3">
                                             <p:txEl>
-                                              <p:pRg st="7" end="7"/>
+                                              <p:pRg st="3" end="3"/>
+                                            </p:txEl>
+                                          </p:spTgt>
+                                        </p:tgtEl>
+                                        <p:attrNameLst>
+                                          <p:attrName>style.visibility</p:attrName>
+                                        </p:attrNameLst>
+                                      </p:cBhvr>
+                                      <p:to>
+                                        <p:strVal val="visible"/>
+                                      </p:to>
+                                    </p:set>
+                                  </p:childTnLst>
+                                </p:cTn>
+                              </p:par>
+                            </p:childTnLst>
+                          </p:cTn>
+                        </p:par>
+                      </p:childTnLst>
+                    </p:cTn>
+                  </p:par>
+                  <p:par>
+                    <p:cTn id="35" fill="hold">
+                      <p:stCondLst>
+                        <p:cond delay="indefinite"/>
+                      </p:stCondLst>
+                      <p:childTnLst>
+                        <p:par>
+                          <p:cTn id="36" fill="hold">
+                            <p:stCondLst>
+                              <p:cond delay="0"/>
+                            </p:stCondLst>
+                            <p:childTnLst>
+                              <p:par>
+                                <p:cTn id="37" presetID="1" presetClass="entr" presetSubtype="0" fill="hold" nodeType="clickEffect">
+                                  <p:stCondLst>
+                                    <p:cond delay="0"/>
+                                  </p:stCondLst>
+                                  <p:childTnLst>
+                                    <p:set>
+                                      <p:cBhvr>
+                                        <p:cTn id="38" dur="1" fill="hold">
+                                          <p:stCondLst>
+                                            <p:cond delay="0"/>
+                                          </p:stCondLst>
+                                        </p:cTn>
+                                        <p:tgtEl>
+                                          <p:spTgt spid="3">
+                                            <p:txEl>
+                                              <p:pRg st="4" end="4"/>
+                                            </p:txEl>
+                                          </p:spTgt>
+                                        </p:tgtEl>
+                                        <p:attrNameLst>
+                                          <p:attrName>style.visibility</p:attrName>
+                                        </p:attrNameLst>
+                                      </p:cBhvr>
+                                      <p:to>
+                                        <p:strVal val="visible"/>
+                                      </p:to>
+                                    </p:set>
+                                  </p:childTnLst>
+                                </p:cTn>
+                              </p:par>
+                            </p:childTnLst>
+                          </p:cTn>
+                        </p:par>
+                      </p:childTnLst>
+                    </p:cTn>
+                  </p:par>
+                  <p:par>
+                    <p:cTn id="39" fill="hold">
+                      <p:stCondLst>
+                        <p:cond delay="indefinite"/>
+                      </p:stCondLst>
+                      <p:childTnLst>
+                        <p:par>
+                          <p:cTn id="40" fill="hold">
+                            <p:stCondLst>
+                              <p:cond delay="0"/>
+                            </p:stCondLst>
+                            <p:childTnLst>
+                              <p:par>
+                                <p:cTn id="41" presetID="1" presetClass="entr" presetSubtype="0" fill="hold" nodeType="clickEffect">
+                                  <p:stCondLst>
+                                    <p:cond delay="0"/>
+                                  </p:stCondLst>
+                                  <p:childTnLst>
+                                    <p:set>
+                                      <p:cBhvr>
+                                        <p:cTn id="42" dur="1" fill="hold">
+                                          <p:stCondLst>
+                                            <p:cond delay="0"/>
+                                          </p:stCondLst>
+                                        </p:cTn>
+                                        <p:tgtEl>
+                                          <p:spTgt spid="3">
+                                            <p:txEl>
+                                              <p:pRg st="6" end="6"/>
+                                            </p:txEl>
+                                          </p:spTgt>
+                                        </p:tgtEl>
+                                        <p:attrNameLst>
+                                          <p:attrName>style.visibility</p:attrName>
+                                        </p:attrNameLst>
+                                      </p:cBhvr>
+                                      <p:to>
+                                        <p:strVal val="visible"/>
+                                      </p:to>
+                                    </p:set>
+                                  </p:childTnLst>
+                                </p:cTn>
+                              </p:par>
+                            </p:childTnLst>
+                          </p:cTn>
+                        </p:par>
+                      </p:childTnLst>
+                    </p:cTn>
+                  </p:par>
+                  <p:par>
+                    <p:cTn id="43" fill="hold">
+                      <p:stCondLst>
+                        <p:cond delay="indefinite"/>
+                      </p:stCondLst>
+                      <p:childTnLst>
+                        <p:par>
+                          <p:cTn id="44" fill="hold">
+                            <p:stCondLst>
+                              <p:cond delay="0"/>
+                            </p:stCondLst>
+                            <p:childTnLst>
+                              <p:par>
+                                <p:cTn id="45" presetID="1" presetClass="entr" presetSubtype="0" fill="hold" nodeType="clickEffect">
+                                  <p:stCondLst>
+                                    <p:cond delay="0"/>
+                                  </p:stCondLst>
+                                  <p:childTnLst>
+                                    <p:set>
+                                      <p:cBhvr>
+                                        <p:cTn id="46" dur="1" fill="hold">
+                                          <p:stCondLst>
+                                            <p:cond delay="0"/>
+                                          </p:stCondLst>
+                                        </p:cTn>
+                                        <p:tgtEl>
+                                          <p:spTgt spid="3">
+                                            <p:txEl>
+                                              <p:pRg st="10" end="10"/>
                                             </p:txEl>
                                           </p:spTgt>
                                         </p:tgtEl>
@@ -6066,7 +6240,7 @@
           <a:p>
             <a:r>
               <a:rPr lang="en-US" dirty="0"/>
-              <a:t>3 Programming Assignments: due before class  </a:t>
+              <a:t>2 Programming Assignments: due before class  </a:t>
             </a:r>
             <a:r>
               <a:rPr lang="en-US" dirty="0">
@@ -6085,45 +6259,14 @@
             <a:pPr lvl="1"/>
             <a:r>
               <a:rPr lang="en-US" dirty="0"/>
-              <a:t>Ex1: Small Coding Exercise (individual)		</a:t>
-            </a:r>
-            <a:r>
-              <a:rPr lang="en-US" b="1" dirty="0"/>
-              <a:t>due </a:t>
-            </a:r>
+              <a:t>Ex1: Small Coding Exercise (individual)</a:t>
+            </a:r>
+          </a:p>
+          <a:p>
+            <a:pPr lvl="1"/>
             <a:r>
               <a:rPr lang="en-US" dirty="0"/>
-              <a:t>on Wednesday before class</a:t>
-            </a:r>
-          </a:p>
-          <a:p>
-            <a:pPr lvl="1"/>
-            <a:r>
-              <a:rPr lang="en-US" dirty="0"/>
-              <a:t>Ex2 : a simple interactive application (individual)	</a:t>
-            </a:r>
-            <a:r>
-              <a:rPr lang="en-US" b="1" dirty="0"/>
-              <a:t>due </a:t>
-            </a:r>
-            <a:r>
-              <a:rPr lang="en-US" dirty="0"/>
-              <a:t>on Friday before class</a:t>
-            </a:r>
-          </a:p>
-          <a:p>
-            <a:pPr lvl="1"/>
-            <a:r>
-              <a:rPr lang="en-US" dirty="0"/>
-              <a:t>Ex3: a simple (not fun) game (team) 		</a:t>
-            </a:r>
-            <a:r>
-              <a:rPr lang="en-US" b="1" dirty="0"/>
-              <a:t>due </a:t>
-            </a:r>
-            <a:r>
-              <a:rPr lang="en-US" dirty="0"/>
-              <a:t>on next Monday before class</a:t>
+              <a:t>Ex2 : a simple interactive application (individual)</a:t>
             </a:r>
           </a:p>
           <a:p>
@@ -6133,7 +6276,7 @@
             </a:r>
             <a:r>
               <a:rPr lang="en-US" dirty="0"/>
-              <a:t>on Tuesday, Thursday, and Friday beginning of class</a:t>
+              <a:t>(x3) at beginning of classes</a:t>
             </a:r>
             <a:r>
               <a:rPr lang="en-US" b="1" dirty="0"/>
@@ -6152,6 +6295,16 @@
             <a:r>
               <a:rPr lang="en-US" dirty="0"/>
               <a:t>open book, open everything, individual effort</a:t>
+            </a:r>
+          </a:p>
+          <a:p>
+            <a:r>
+              <a:rPr lang="en-US" b="1" dirty="0"/>
+              <a:t>Design: </a:t>
+            </a:r>
+            <a:r>
+              <a:rPr lang="en-US" dirty="0"/>
+              <a:t>your final game</a:t>
             </a:r>
           </a:p>
           <a:p>
@@ -6400,15 +6553,33 @@
                                   </p:childTnLst>
                                 </p:cTn>
                               </p:par>
+                            </p:childTnLst>
+                          </p:cTn>
+                        </p:par>
+                      </p:childTnLst>
+                    </p:cTn>
+                  </p:par>
+                  <p:par>
+                    <p:cTn id="19" fill="hold">
+                      <p:stCondLst>
+                        <p:cond delay="indefinite"/>
+                      </p:stCondLst>
+                      <p:childTnLst>
+                        <p:par>
+                          <p:cTn id="20" fill="hold">
+                            <p:stCondLst>
+                              <p:cond delay="0"/>
+                            </p:stCondLst>
+                            <p:childTnLst>
                               <p:par>
-                                <p:cTn id="19" presetID="1" presetClass="entr" presetSubtype="0" fill="hold" grpId="0" nodeType="withEffect">
+                                <p:cTn id="21" presetID="1" presetClass="entr" presetSubtype="0" fill="hold" grpId="0" nodeType="clickEffect">
                                   <p:stCondLst>
                                     <p:cond delay="0"/>
                                   </p:stCondLst>
                                   <p:childTnLst>
                                     <p:set>
                                       <p:cBhvr>
-                                        <p:cTn id="20" dur="1" fill="hold">
+                                        <p:cTn id="22" dur="1" fill="hold">
                                           <p:stCondLst>
                                             <p:cond delay="0"/>
                                           </p:stCondLst>
@@ -6431,26 +6602,8 @@
                                   </p:childTnLst>
                                 </p:cTn>
                               </p:par>
-                            </p:childTnLst>
-                          </p:cTn>
-                        </p:par>
-                      </p:childTnLst>
-                    </p:cTn>
-                  </p:par>
-                  <p:par>
-                    <p:cTn id="21" fill="hold">
-                      <p:stCondLst>
-                        <p:cond delay="indefinite"/>
-                      </p:stCondLst>
-                      <p:childTnLst>
-                        <p:par>
-                          <p:cTn id="22" fill="hold">
-                            <p:stCondLst>
-                              <p:cond delay="0"/>
-                            </p:stCondLst>
-                            <p:childTnLst>
                               <p:par>
-                                <p:cTn id="23" presetID="1" presetClass="entr" presetSubtype="0" fill="hold" grpId="0" nodeType="clickEffect">
+                                <p:cTn id="23" presetID="1" presetClass="entr" presetSubtype="0" fill="hold" grpId="0" nodeType="withEffect">
                                   <p:stCondLst>
                                     <p:cond delay="0"/>
                                   </p:stCondLst>
@@ -6511,15 +6664,33 @@
                                   </p:childTnLst>
                                 </p:cTn>
                               </p:par>
+                            </p:childTnLst>
+                          </p:cTn>
+                        </p:par>
+                      </p:childTnLst>
+                    </p:cTn>
+                  </p:par>
+                  <p:par>
+                    <p:cTn id="27" fill="hold">
+                      <p:stCondLst>
+                        <p:cond delay="indefinite"/>
+                      </p:stCondLst>
+                      <p:childTnLst>
+                        <p:par>
+                          <p:cTn id="28" fill="hold">
+                            <p:stCondLst>
+                              <p:cond delay="0"/>
+                            </p:stCondLst>
+                            <p:childTnLst>
                               <p:par>
-                                <p:cTn id="27" presetID="1" presetClass="entr" presetSubtype="0" fill="hold" grpId="0" nodeType="withEffect">
+                                <p:cTn id="29" presetID="1" presetClass="entr" presetSubtype="0" fill="hold" grpId="0" nodeType="clickEffect">
                                   <p:stCondLst>
                                     <p:cond delay="0"/>
                                   </p:stCondLst>
                                   <p:childTnLst>
                                     <p:set>
                                       <p:cBhvr>
-                                        <p:cTn id="28" dur="1" fill="hold">
+                                        <p:cTn id="30" dur="1" fill="hold">
                                           <p:stCondLst>
                                             <p:cond delay="0"/>
                                           </p:stCondLst>
@@ -6549,26 +6720,26 @@
                     </p:cTn>
                   </p:par>
                   <p:par>
-                    <p:cTn id="29" fill="hold">
+                    <p:cTn id="31" fill="hold">
                       <p:stCondLst>
                         <p:cond delay="indefinite"/>
                       </p:stCondLst>
                       <p:childTnLst>
                         <p:par>
-                          <p:cTn id="30" fill="hold">
+                          <p:cTn id="32" fill="hold">
                             <p:stCondLst>
                               <p:cond delay="0"/>
                             </p:stCondLst>
                             <p:childTnLst>
                               <p:par>
-                                <p:cTn id="31" presetID="1" presetClass="entr" presetSubtype="0" fill="hold" grpId="0" nodeType="clickEffect">
+                                <p:cTn id="33" presetID="1" presetClass="entr" presetSubtype="0" fill="hold" grpId="0" nodeType="clickEffect">
                                   <p:stCondLst>
                                     <p:cond delay="0"/>
                                   </p:stCondLst>
                                   <p:childTnLst>
                                     <p:set>
                                       <p:cBhvr>
-                                        <p:cTn id="32" dur="1" fill="hold">
+                                        <p:cTn id="34" dur="1" fill="hold">
                                           <p:stCondLst>
                                             <p:cond delay="0"/>
                                           </p:stCondLst>
@@ -6664,13 +6835,14 @@
           <a:lstStyle/>
           <a:p>
             <a:r>
+              <a:rPr lang="en-US" dirty="0"/>
+              <a:t>Week 2 + 3: Present, Test, and </a:t>
+            </a:r>
+            <a:r>
               <a:rPr lang="en-US" dirty="0" err="1"/>
-              <a:t>WeekEnd</a:t>
-            </a:r>
-            <a:r>
-              <a:rPr lang="en-US" dirty="0"/>
-              <a:t>: How to and Begin to Design </a:t>
-            </a:r>
+              <a:t>Evalutate</a:t>
+            </a:r>
+            <a:endParaRPr lang="en-US" dirty="0"/>
           </a:p>
         </p:txBody>
       </p:sp>
@@ -6697,35 +6869,158 @@
           <a:p>
             <a:r>
               <a:rPr lang="en-US" dirty="0"/>
-              <a:t>Saturday: Design process and how to receive feedback</a:t>
+              <a:t>Saturday:</a:t>
             </a:r>
           </a:p>
           <a:p>
             <a:pPr lvl="1"/>
             <a:r>
               <a:rPr lang="en-US" dirty="0"/>
-              <a:t>Brainstorm + Playtest</a:t>
-            </a:r>
-          </a:p>
-          <a:p>
+              <a:t>AM: </a:t>
+            </a:r>
+            <a:r>
+              <a:rPr lang="en-US" b="1" dirty="0">
+                <a:solidFill>
+                  <a:srgbClr val="FFFF00"/>
+                </a:solidFill>
+              </a:rPr>
+              <a:t>Presentation: </a:t>
+            </a:r>
+            <a:r>
+              <a:rPr lang="en-US" b="1" i="1" u="sng" dirty="0"/>
+              <a:t>show</a:t>
+            </a:r>
             <a:r>
               <a:rPr lang="en-US" dirty="0"/>
-              <a:t>Sunday: Game design</a:t>
+              <a:t> and tell us your final game idea</a:t>
             </a:r>
           </a:p>
           <a:p>
             <a:pPr lvl="1"/>
             <a:r>
               <a:rPr lang="en-US" dirty="0"/>
-              <a:t>Come to class to complete your game design</a:t>
+              <a:t>PM: Meet with me to discuss challenges</a:t>
+            </a:r>
+          </a:p>
+          <a:p>
+            <a:r>
+              <a:rPr lang="en-US" dirty="0"/>
+              <a:t>Next Monday + Wednesday:</a:t>
             </a:r>
           </a:p>
           <a:p>
             <a:pPr lvl="1"/>
             <a:r>
               <a:rPr lang="en-US" dirty="0"/>
-              <a:t>I will meet with each team individually</a:t>
-            </a:r>
+              <a:t>Monday: </a:t>
+            </a:r>
+            <a:r>
+              <a:rPr lang="en-US" b="1" dirty="0">
+                <a:solidFill>
+                  <a:srgbClr val="FFFF00"/>
+                </a:solidFill>
+              </a:rPr>
+              <a:t>Presentation: </a:t>
+            </a:r>
+            <a:r>
+              <a:rPr lang="en-US" dirty="0"/>
+              <a:t>Game prototype demo (show</a:t>
+            </a:r>
+            <a:r>
+              <a:rPr lang="en-US" b="1" i="1" dirty="0"/>
+              <a:t> </a:t>
+            </a:r>
+            <a:r>
+              <a:rPr lang="en-US" dirty="0"/>
+              <a:t>us your by </a:t>
+            </a:r>
+            <a:r>
+              <a:rPr lang="en-US" b="1" i="1" u="sng" dirty="0"/>
+              <a:t>playing</a:t>
+            </a:r>
+            <a:r>
+              <a:rPr lang="en-US" b="1" i="1" dirty="0"/>
+              <a:t> </a:t>
+            </a:r>
+            <a:r>
+              <a:rPr lang="en-US" dirty="0"/>
+              <a:t>your rough build)</a:t>
+            </a:r>
+          </a:p>
+          <a:p>
+            <a:pPr lvl="1"/>
+            <a:r>
+              <a:rPr lang="en-US" dirty="0">
+                <a:solidFill>
+                  <a:srgbClr val="FFFF00"/>
+                </a:solidFill>
+              </a:rPr>
+              <a:t>Wednesday: </a:t>
+            </a:r>
+            <a:r>
+              <a:rPr lang="en-US" b="1" dirty="0">
+                <a:solidFill>
+                  <a:srgbClr val="FFFF00"/>
+                </a:solidFill>
+              </a:rPr>
+              <a:t>Everyone plays everyone else’s games</a:t>
+            </a:r>
+            <a:r>
+              <a:rPr lang="en-US" dirty="0"/>
+              <a:t>: Alpha game playtest</a:t>
+            </a:r>
+            <a:br>
+              <a:rPr lang="en-US" dirty="0"/>
+            </a:br>
+            <a:endParaRPr lang="en-US" dirty="0"/>
+          </a:p>
+          <a:p>
+            <a:pPr marL="0" indent="0">
+              <a:buNone/>
+            </a:pPr>
+            <a:r>
+              <a:rPr lang="en-US" b="1" dirty="0">
+                <a:solidFill>
+                  <a:srgbClr val="FFFF00"/>
+                </a:solidFill>
+              </a:rPr>
+              <a:t>Rest + Work for the rest of the week</a:t>
+            </a:r>
+            <a:br>
+              <a:rPr lang="en-US" b="1" dirty="0">
+                <a:solidFill>
+                  <a:srgbClr val="FFFF00"/>
+                </a:solidFill>
+              </a:rPr>
+            </a:br>
+            <a:endParaRPr lang="en-US" b="1" dirty="0">
+              <a:solidFill>
+                <a:srgbClr val="FFFF00"/>
+              </a:solidFill>
+            </a:endParaRPr>
+          </a:p>
+          <a:p>
+            <a:r>
+              <a:rPr lang="en-US" dirty="0"/>
+              <a:t>Last day of class Monday March 17</a:t>
+            </a:r>
+            <a:r>
+              <a:rPr lang="en-US" baseline="30000" dirty="0"/>
+              <a:t>th</a:t>
+            </a:r>
+            <a:r>
+              <a:rPr lang="en-US" b="1" dirty="0"/>
+              <a:t>: </a:t>
+            </a:r>
+            <a:r>
+              <a:rPr lang="en-US" b="1" dirty="0">
+                <a:solidFill>
+                  <a:srgbClr val="FFFF00"/>
+                </a:solidFill>
+              </a:rPr>
+              <a:t>Whole class plays!</a:t>
+            </a:r>
+            <a:endParaRPr lang="en-US" dirty="0"/>
           </a:p>
         </p:txBody>
       </p:sp>
@@ -6992,6 +7287,153 @@
                       </p:childTnLst>
                     </p:cTn>
                   </p:par>
+                  <p:par>
+                    <p:cTn id="23" fill="hold">
+                      <p:stCondLst>
+                        <p:cond delay="indefinite"/>
+                      </p:stCondLst>
+                      <p:childTnLst>
+                        <p:par>
+                          <p:cTn id="24" fill="hold">
+                            <p:stCondLst>
+                              <p:cond delay="0"/>
+                            </p:stCondLst>
+                            <p:childTnLst>
+                              <p:par>
+                                <p:cTn id="25" presetID="1" presetClass="entr" presetSubtype="0" fill="hold" nodeType="clickEffect">
+                                  <p:stCondLst>
+                                    <p:cond delay="0"/>
+                                  </p:stCondLst>
+                                  <p:childTnLst>
+                                    <p:set>
+                                      <p:cBhvr>
+                                        <p:cTn id="26" dur="1" fill="hold">
+                                          <p:stCondLst>
+                                            <p:cond delay="0"/>
+                                          </p:stCondLst>
+                                        </p:cTn>
+                                        <p:tgtEl>
+                                          <p:spTgt spid="3">
+                                            <p:txEl>
+                                              <p:pRg st="5" end="5"/>
+                                            </p:txEl>
+                                          </p:spTgt>
+                                        </p:tgtEl>
+                                        <p:attrNameLst>
+                                          <p:attrName>style.visibility</p:attrName>
+                                        </p:attrNameLst>
+                                      </p:cBhvr>
+                                      <p:to>
+                                        <p:strVal val="visible"/>
+                                      </p:to>
+                                    </p:set>
+                                  </p:childTnLst>
+                                </p:cTn>
+                              </p:par>
+                            </p:childTnLst>
+                          </p:cTn>
+                        </p:par>
+                      </p:childTnLst>
+                    </p:cTn>
+                  </p:par>
+                  <p:par>
+                    <p:cTn id="27" fill="hold">
+                      <p:stCondLst>
+                        <p:cond delay="indefinite"/>
+                      </p:stCondLst>
+                      <p:childTnLst>
+                        <p:par>
+                          <p:cTn id="28" fill="hold">
+                            <p:stCondLst>
+                              <p:cond delay="0"/>
+                            </p:stCondLst>
+                            <p:childTnLst>
+                              <p:par>
+                                <p:cTn id="29" presetID="1" presetClass="entr" presetSubtype="0" fill="hold" nodeType="clickEffect">
+                                  <p:stCondLst>
+                                    <p:cond delay="0"/>
+                                  </p:stCondLst>
+                                  <p:childTnLst>
+                                    <p:set>
+                                      <p:cBhvr>
+                                        <p:cTn id="30" dur="1" fill="hold">
+                                          <p:stCondLst>
+                                            <p:cond delay="0"/>
+                                          </p:stCondLst>
+                                        </p:cTn>
+                                        <p:tgtEl>
+                                          <p:spTgt spid="3">
+                                            <p:txEl>
+                                              <p:pRg st="6" end="6"/>
+                                            </p:txEl>
+                                          </p:spTgt>
+                                        </p:tgtEl>
+                                        <p:attrNameLst>
+                                          <p:attrName>style.visibility</p:attrName>
+                                        </p:attrNameLst>
+                                      </p:cBhvr>
+                                      <p:to>
+                                        <p:strVal val="visible"/>
+                                      </p:to>
+                                    </p:set>
+                                  </p:childTnLst>
+                                </p:cTn>
+                              </p:par>
+                            </p:childTnLst>
+                          </p:cTn>
+                        </p:par>
+                      </p:childTnLst>
+                    </p:cTn>
+                  </p:par>
+                  <p:par>
+                    <p:cTn id="31" fill="hold">
+                      <p:stCondLst>
+                        <p:cond delay="indefinite"/>
+                      </p:stCondLst>
+                      <p:childTnLst>
+                        <p:par>
+                          <p:cTn id="32" fill="hold">
+                            <p:stCondLst>
+                              <p:cond delay="0"/>
+                            </p:stCondLst>
+                            <p:childTnLst>
+                              <p:par>
+                                <p:cTn id="33" presetID="1" presetClass="entr" presetSubtype="0" fill="hold" nodeType="clickEffect">
+                                  <p:stCondLst>
+                                    <p:cond delay="0"/>
+                                  </p:stCondLst>
+                                  <p:childTnLst>
+                                    <p:set>
+                                      <p:cBhvr>
+                                        <p:cTn id="34" dur="1" fill="hold">
+                                          <p:stCondLst>
+                                            <p:cond delay="0"/>
+                                          </p:stCondLst>
+                                        </p:cTn>
+                                        <p:tgtEl>
+                                          <p:spTgt spid="3">
+                                            <p:txEl>
+                                              <p:pRg st="7" end="7"/>
+                                            </p:txEl>
+                                          </p:spTgt>
+                                        </p:tgtEl>
+                                        <p:attrNameLst>
+                                          <p:attrName>style.visibility</p:attrName>
+                                        </p:attrNameLst>
+                                      </p:cBhvr>
+                                      <p:to>
+                                        <p:strVal val="visible"/>
+                                      </p:to>
+                                    </p:set>
+                                  </p:childTnLst>
+                                </p:cTn>
+                              </p:par>
+                            </p:childTnLst>
+                          </p:cTn>
+                        </p:par>
+                      </p:childTnLst>
+                    </p:cTn>
+                  </p:par>
                 </p:childTnLst>
               </p:cTn>
               <p:prevCondLst>
@@ -7051,7 +7493,7 @@
           <a:p>
             <a:r>
               <a:rPr lang="en-US" dirty="0"/>
-              <a:t>Week 2: Build an Awesome Game (in 3 days!)</a:t>
+              <a:t>Game Ranking:</a:t>
             </a:r>
           </a:p>
         </p:txBody>
@@ -7074,113 +7516,12 @@
         </p:spPr>
         <p:txBody>
           <a:bodyPr>
-            <a:normAutofit lnSpcReduction="10000"/>
+            <a:normAutofit/>
           </a:bodyPr>
           <a:lstStyle/>
           <a:p>
             <a:pPr lvl="1"/>
             <a:r>
-              <a:rPr lang="en-US" b="1" dirty="0"/>
-              <a:t>Schedule</a:t>
-            </a:r>
-          </a:p>
-          <a:p>
-            <a:pPr lvl="2"/>
-            <a:r>
-              <a:rPr lang="en-US" b="1" dirty="0"/>
-              <a:t>Monday: 	</a:t>
-            </a:r>
-            <a:r>
-              <a:rPr lang="en-US" b="1" dirty="0">
-                <a:solidFill>
-                  <a:srgbClr val="FFFF00"/>
-                </a:solidFill>
-              </a:rPr>
-              <a:t>Presentation: </a:t>
-            </a:r>
-            <a:r>
-              <a:rPr lang="en-US" dirty="0"/>
-              <a:t>Your final game proposal</a:t>
-            </a:r>
-          </a:p>
-          <a:p>
-            <a:pPr lvl="2"/>
-            <a:r>
-              <a:rPr lang="en-US" b="1" dirty="0"/>
-              <a:t>Tuesday: 	</a:t>
-            </a:r>
-            <a:r>
-              <a:rPr lang="en-US" b="1" dirty="0">
-                <a:solidFill>
-                  <a:srgbClr val="FFFF00"/>
-                </a:solidFill>
-              </a:rPr>
-              <a:t>Presentation: </a:t>
-            </a:r>
-            <a:r>
-              <a:rPr lang="en-US" dirty="0"/>
-              <a:t>Game prototype demo</a:t>
-            </a:r>
-            <a:endParaRPr lang="en-US" b="1" dirty="0">
-              <a:solidFill>
-                <a:srgbClr val="FFFF00"/>
-              </a:solidFill>
-            </a:endParaRPr>
-          </a:p>
-          <a:p>
-            <a:pPr lvl="2"/>
-            <a:r>
-              <a:rPr lang="en-US" b="1" dirty="0"/>
-              <a:t>Wednesday:     	</a:t>
-            </a:r>
-            <a:r>
-              <a:rPr lang="en-US" b="1" dirty="0">
-                <a:solidFill>
-                  <a:srgbClr val="FFFF00"/>
-                </a:solidFill>
-              </a:rPr>
-              <a:t>Presentation + Everyone plays everyone else’s games</a:t>
-            </a:r>
-            <a:r>
-              <a:rPr lang="en-US" dirty="0"/>
-              <a:t>: Alpha game playtest</a:t>
-            </a:r>
-            <a:endParaRPr lang="en-US" b="1" dirty="0">
-              <a:solidFill>
-                <a:srgbClr val="FFFF00"/>
-              </a:solidFill>
-            </a:endParaRPr>
-          </a:p>
-          <a:p>
-            <a:pPr lvl="2"/>
-            <a:r>
-              <a:rPr lang="en-US" b="1" dirty="0"/>
-              <a:t>Thursday: 	</a:t>
-            </a:r>
-            <a:r>
-              <a:rPr lang="en-US" b="1" dirty="0">
-                <a:solidFill>
-                  <a:srgbClr val="FFFF00"/>
-                </a:solidFill>
-              </a:rPr>
-              <a:t>Presentation + Whole class plays!</a:t>
-            </a:r>
-            <a:br>
-              <a:rPr lang="en-US" b="1" dirty="0">
-                <a:solidFill>
-                  <a:srgbClr val="FFFF00"/>
-                </a:solidFill>
-              </a:rPr>
-            </a:br>
-            <a:endParaRPr lang="en-US" b="1" dirty="0">
-              <a:solidFill>
-                <a:srgbClr val="FFFF00"/>
-              </a:solidFill>
-            </a:endParaRPr>
-          </a:p>
-          <a:p>
-            <a:pPr lvl="1"/>
-            <a:r>
               <a:rPr lang="en-US" dirty="0"/>
               <a:t>Whole class will rank the teams after the presentations. Top ranked teams:</a:t>
             </a:r>
@@ -7189,39 +7530,27 @@
             <a:pPr lvl="2"/>
             <a:r>
               <a:rPr lang="en-US" dirty="0"/>
-              <a:t>First: +5%</a:t>
+              <a:t>First: +3%</a:t>
             </a:r>
           </a:p>
           <a:p>
             <a:pPr lvl="2"/>
             <a:r>
               <a:rPr lang="en-US" dirty="0"/>
-              <a:t>Second: +4%</a:t>
+              <a:t>Second: +2%</a:t>
             </a:r>
           </a:p>
           <a:p>
             <a:pPr lvl="2"/>
             <a:r>
               <a:rPr lang="en-US" dirty="0"/>
-              <a:t>Third: +3%</a:t>
-            </a:r>
-          </a:p>
-          <a:p>
-            <a:pPr lvl="2"/>
-            <a:r>
-              <a:rPr lang="en-US" dirty="0"/>
-              <a:t>Forth: +2%</a:t>
-            </a:r>
-          </a:p>
-          <a:p>
-            <a:pPr lvl="2"/>
-            <a:r>
-              <a:rPr lang="en-US" dirty="0"/>
-              <a:t>Fifth: +1%</a:t>
-            </a:r>
-          </a:p>
-          <a:p>
-            <a:pPr lvl="1"/>
+              <a:t>Third: +1%</a:t>
+            </a:r>
+          </a:p>
+          <a:p>
+            <a:pPr marL="457200" lvl="1" indent="0">
+              <a:buNone/>
+            </a:pPr>
             <a:endParaRPr lang="en-US" dirty="0"/>
           </a:p>
         </p:txBody>
@@ -7440,349 +7769,6 @@
                       </p:childTnLst>
                     </p:cTn>
                   </p:par>
-                  <p:par>
-                    <p:cTn id="19" fill="hold">
-                      <p:stCondLst>
-                        <p:cond delay="indefinite"/>
-                      </p:stCondLst>
-                      <p:childTnLst>
-                        <p:par>
-                          <p:cTn id="20" fill="hold">
-                            <p:stCondLst>
-                              <p:cond delay="0"/>
-                            </p:stCondLst>
-                            <p:childTnLst>
-                              <p:par>
-                                <p:cTn id="21" presetID="1" presetClass="entr" presetSubtype="0" fill="hold" grpId="0" nodeType="clickEffect">
-                                  <p:stCondLst>
-                                    <p:cond delay="0"/>
-                                  </p:stCondLst>
-                                  <p:childTnLst>
-                                    <p:set>
-                                      <p:cBhvr>
-                                        <p:cTn id="22" dur="1" fill="hold">
-                                          <p:stCondLst>
-                                            <p:cond delay="0"/>
-                                          </p:stCondLst>
-                                        </p:cTn>
-                                        <p:tgtEl>
-                                          <p:spTgt spid="3">
-                                            <p:txEl>
-                                              <p:pRg st="4" end="4"/>
-                                            </p:txEl>
-                                          </p:spTgt>
-                                        </p:tgtEl>
-                                        <p:attrNameLst>
-                                          <p:attrName>style.visibility</p:attrName>
-                                        </p:attrNameLst>
-                                      </p:cBhvr>
-                                      <p:to>
-                                        <p:strVal val="visible"/>
-                                      </p:to>
-                                    </p:set>
-                                  </p:childTnLst>
-                                </p:cTn>
-                              </p:par>
-                            </p:childTnLst>
-                          </p:cTn>
-                        </p:par>
-                      </p:childTnLst>
-                    </p:cTn>
-                  </p:par>
-                  <p:par>
-                    <p:cTn id="23" fill="hold">
-                      <p:stCondLst>
-                        <p:cond delay="indefinite"/>
-                      </p:stCondLst>
-                      <p:childTnLst>
-                        <p:par>
-                          <p:cTn id="24" fill="hold">
-                            <p:stCondLst>
-                              <p:cond delay="0"/>
-                            </p:stCondLst>
-                            <p:childTnLst>
-                              <p:par>
-                                <p:cTn id="25" presetID="1" presetClass="entr" presetSubtype="0" fill="hold" grpId="0" nodeType="clickEffect">
-                                  <p:stCondLst>
-                                    <p:cond delay="0"/>
-                                  </p:stCondLst>
-                                  <p:childTnLst>
-                                    <p:set>
-                                      <p:cBhvr>
-                                        <p:cTn id="26" dur="1" fill="hold">
-                                          <p:stCondLst>
-                                            <p:cond delay="0"/>
-                                          </p:stCondLst>
-                                        </p:cTn>
-                                        <p:tgtEl>
-                                          <p:spTgt spid="3">
-                                            <p:txEl>
-                                              <p:pRg st="5" end="5"/>
-                                            </p:txEl>
-                                          </p:spTgt>
-                                        </p:tgtEl>
-                                        <p:attrNameLst>
-                                          <p:attrName>style.visibility</p:attrName>
-                                        </p:attrNameLst>
-                                      </p:cBhvr>
-                                      <p:to>
-                                        <p:strVal val="visible"/>
-                                      </p:to>
-                                    </p:set>
-                                  </p:childTnLst>
-                                </p:cTn>
-                              </p:par>
-                            </p:childTnLst>
-                          </p:cTn>
-                        </p:par>
-                      </p:childTnLst>
-                    </p:cTn>
-                  </p:par>
-                  <p:par>
-                    <p:cTn id="27" fill="hold">
-                      <p:stCondLst>
-                        <p:cond delay="indefinite"/>
-                      </p:stCondLst>
-                      <p:childTnLst>
-                        <p:par>
-                          <p:cTn id="28" fill="hold">
-                            <p:stCondLst>
-                              <p:cond delay="0"/>
-                            </p:stCondLst>
-                            <p:childTnLst>
-                              <p:par>
-                                <p:cTn id="29" presetID="1" presetClass="entr" presetSubtype="0" fill="hold" grpId="0" nodeType="clickEffect">
-                                  <p:stCondLst>
-                                    <p:cond delay="0"/>
-                                  </p:stCondLst>
-                                  <p:childTnLst>
-                                    <p:set>
-                                      <p:cBhvr>
-                                        <p:cTn id="30" dur="1" fill="hold">
-                                          <p:stCondLst>
-                                            <p:cond delay="0"/>
-                                          </p:stCondLst>
-                                        </p:cTn>
-                                        <p:tgtEl>
-                                          <p:spTgt spid="3">
-                                            <p:txEl>
-                                              <p:pRg st="6" end="6"/>
-                                            </p:txEl>
-                                          </p:spTgt>
-                                        </p:tgtEl>
-                                        <p:attrNameLst>
-                                          <p:attrName>style.visibility</p:attrName>
-                                        </p:attrNameLst>
-                                      </p:cBhvr>
-                                      <p:to>
-                                        <p:strVal val="visible"/>
-                                      </p:to>
-                                    </p:set>
-                                  </p:childTnLst>
-                                </p:cTn>
-                              </p:par>
-                            </p:childTnLst>
-                          </p:cTn>
-                        </p:par>
-                      </p:childTnLst>
-                    </p:cTn>
-                  </p:par>
-                  <p:par>
-                    <p:cTn id="31" fill="hold">
-                      <p:stCondLst>
-                        <p:cond delay="indefinite"/>
-                      </p:stCondLst>
-                      <p:childTnLst>
-                        <p:par>
-                          <p:cTn id="32" fill="hold">
-                            <p:stCondLst>
-                              <p:cond delay="0"/>
-                            </p:stCondLst>
-                            <p:childTnLst>
-                              <p:par>
-                                <p:cTn id="33" presetID="1" presetClass="entr" presetSubtype="0" fill="hold" grpId="0" nodeType="clickEffect">
-                                  <p:stCondLst>
-                                    <p:cond delay="0"/>
-                                  </p:stCondLst>
-                                  <p:childTnLst>
-                                    <p:set>
-                                      <p:cBhvr>
-                                        <p:cTn id="34" dur="1" fill="hold">
-                                          <p:stCondLst>
-                                            <p:cond delay="0"/>
-                                          </p:stCondLst>
-                                        </p:cTn>
-                                        <p:tgtEl>
-                                          <p:spTgt spid="3">
-                                            <p:txEl>
-                                              <p:pRg st="7" end="7"/>
-                                            </p:txEl>
-                                          </p:spTgt>
-                                        </p:tgtEl>
-                                        <p:attrNameLst>
-                                          <p:attrName>style.visibility</p:attrName>
-                                        </p:attrNameLst>
-                                      </p:cBhvr>
-                                      <p:to>
-                                        <p:strVal val="visible"/>
-                                      </p:to>
-                                    </p:set>
-                                  </p:childTnLst>
-                                </p:cTn>
-                              </p:par>
-                            </p:childTnLst>
-                          </p:cTn>
-                        </p:par>
-                      </p:childTnLst>
-                    </p:cTn>
-                  </p:par>
-                  <p:par>
-                    <p:cTn id="35" fill="hold">
-                      <p:stCondLst>
-                        <p:cond delay="indefinite"/>
-                      </p:stCondLst>
-                      <p:childTnLst>
-                        <p:par>
-                          <p:cTn id="36" fill="hold">
-                            <p:stCondLst>
-                              <p:cond delay="0"/>
-                            </p:stCondLst>
-                            <p:childTnLst>
-                              <p:par>
-                                <p:cTn id="37" presetID="1" presetClass="entr" presetSubtype="0" fill="hold" grpId="0" nodeType="clickEffect">
-                                  <p:stCondLst>
-                                    <p:cond delay="0"/>
-                                  </p:stCondLst>
-                                  <p:childTnLst>
-                                    <p:set>
-                                      <p:cBhvr>
-                                        <p:cTn id="38" dur="1" fill="hold">
-                                          <p:stCondLst>
-                                            <p:cond delay="0"/>
-                                          </p:stCondLst>
-                                        </p:cTn>
-                                        <p:tgtEl>
-                                          <p:spTgt spid="3">
-                                            <p:txEl>
-                                              <p:pRg st="8" end="8"/>
-                                            </p:txEl>
-                                          </p:spTgt>
-                                        </p:tgtEl>
-                                        <p:attrNameLst>
-                                          <p:attrName>style.visibility</p:attrName>
-                                        </p:attrNameLst>
-                                      </p:cBhvr>
-                                      <p:to>
-                                        <p:strVal val="visible"/>
-                                      </p:to>
-                                    </p:set>
-                                  </p:childTnLst>
-                                </p:cTn>
-                              </p:par>
-                            </p:childTnLst>
-                          </p:cTn>
-                        </p:par>
-                      </p:childTnLst>
-                    </p:cTn>
-                  </p:par>
-                  <p:par>
-                    <p:cTn id="39" fill="hold">
-                      <p:stCondLst>
-                        <p:cond delay="indefinite"/>
-                      </p:stCondLst>
-                      <p:childTnLst>
-                        <p:par>
-                          <p:cTn id="40" fill="hold">
-                            <p:stCondLst>
-                              <p:cond delay="0"/>
-                            </p:stCondLst>
-                            <p:childTnLst>
-                              <p:par>
-                                <p:cTn id="41" presetID="1" presetClass="entr" presetSubtype="0" fill="hold" grpId="0" nodeType="clickEffect">
-                                  <p:stCondLst>
-                                    <p:cond delay="0"/>
-                                  </p:stCondLst>
-                                  <p:childTnLst>
-                                    <p:set>
-                                      <p:cBhvr>
-                                        <p:cTn id="42" dur="1" fill="hold">
-                                          <p:stCondLst>
-                                            <p:cond delay="0"/>
-                                          </p:stCondLst>
-                                        </p:cTn>
-                                        <p:tgtEl>
-                                          <p:spTgt spid="3">
-                                            <p:txEl>
-                                              <p:pRg st="9" end="9"/>
-                                            </p:txEl>
-                                          </p:spTgt>
-                                        </p:tgtEl>
-                                        <p:attrNameLst>
-                                          <p:attrName>style.visibility</p:attrName>
-                                        </p:attrNameLst>
-                                      </p:cBhvr>
-                                      <p:to>
-                                        <p:strVal val="visible"/>
-                                      </p:to>
-                                    </p:set>
-                                  </p:childTnLst>
-                                </p:cTn>
-                              </p:par>
-                            </p:childTnLst>
-                          </p:cTn>
-                        </p:par>
-                      </p:childTnLst>
-                    </p:cTn>
-                  </p:par>
-                  <p:par>
-                    <p:cTn id="43" fill="hold">
-                      <p:stCondLst>
-                        <p:cond delay="indefinite"/>
-                      </p:stCondLst>
-                      <p:childTnLst>
-                        <p:par>
-                          <p:cTn id="44" fill="hold">
-                            <p:stCondLst>
-                              <p:cond delay="0"/>
-                            </p:stCondLst>
-                            <p:childTnLst>
-                              <p:par>
-                                <p:cTn id="45" presetID="1" presetClass="entr" presetSubtype="0" fill="hold" grpId="0" nodeType="clickEffect">
-                                  <p:stCondLst>
-                                    <p:cond delay="0"/>
-                                  </p:stCondLst>
-                                  <p:childTnLst>
-                                    <p:set>
-                                      <p:cBhvr>
-                                        <p:cTn id="46" dur="1" fill="hold">
-                                          <p:stCondLst>
-                                            <p:cond delay="0"/>
-                                          </p:stCondLst>
-                                        </p:cTn>
-                                        <p:tgtEl>
-                                          <p:spTgt spid="3">
-                                            <p:txEl>
-                                              <p:pRg st="10" end="10"/>
-                                            </p:txEl>
-                                          </p:spTgt>
-                                        </p:tgtEl>
-                                        <p:attrNameLst>
-                                          <p:attrName>style.visibility</p:attrName>
-                                        </p:attrNameLst>
-                                      </p:cBhvr>
-                                      <p:to>
-                                        <p:strVal val="visible"/>
-                                      </p:to>
-                                    </p:set>
-                                  </p:childTnLst>
-                                </p:cTn>
-                              </p:par>
-                            </p:childTnLst>
-                          </p:cTn>
-                        </p:par>
-                      </p:childTnLst>
-                    </p:cTn>
-                  </p:par>
                 </p:childTnLst>
               </p:cTn>
               <p:prevCondLst>
@@ -7830,10 +7816,10 @@
       </p:grpSpPr>
       <p:pic>
         <p:nvPicPr>
-          <p:cNvPr id="18" name="Picture 17">
+          <p:cNvPr id="3" name="Picture 2">
             <a:extLst>
               <a:ext uri="{FF2B5EF4-FFF2-40B4-BE49-F238E27FC236}">
-                <a16:creationId xmlns:a16="http://schemas.microsoft.com/office/drawing/2014/main" id="{0C23AC1B-74D1-804C-9FFC-EB62E534FC1F}"/>
+                <a16:creationId xmlns:a16="http://schemas.microsoft.com/office/drawing/2014/main" id="{F53D2E2D-8714-4ACB-A308-2CF3A789EEC1}"/>
               </a:ext>
             </a:extLst>
           </p:cNvPr>
@@ -7850,8 +7836,8 @@
         </p:blipFill>
         <p:spPr>
           <a:xfrm>
-            <a:off x="1371600" y="1371600"/>
-            <a:ext cx="5304260" cy="5350667"/>
+            <a:off x="1402505" y="1371600"/>
+            <a:ext cx="5341195" cy="5168470"/>
           </a:xfrm>
           <a:prstGeom prst="rect">
             <a:avLst/>
@@ -8003,7 +7989,7 @@
         </p:nvSpPr>
         <p:spPr>
           <a:xfrm>
-            <a:off x="1295400" y="6019800"/>
+            <a:off x="1325458" y="5943282"/>
             <a:ext cx="4191000" cy="609600"/>
           </a:xfrm>
           <a:prstGeom prst="ellipse">
@@ -8055,7 +8041,7 @@
         </p:nvSpPr>
         <p:spPr>
           <a:xfrm>
-            <a:off x="2743200" y="4191000"/>
+            <a:off x="2731770" y="4191001"/>
             <a:ext cx="2514600" cy="1905000"/>
           </a:xfrm>
           <a:prstGeom prst="rect">
@@ -8281,7 +8267,7 @@
         </p:nvSpPr>
         <p:spPr>
           <a:xfrm>
-            <a:off x="5257800" y="4191000"/>
+            <a:off x="5246370" y="4191001"/>
             <a:ext cx="1600200" cy="2286000"/>
           </a:xfrm>
           <a:prstGeom prst="rect">
@@ -8333,8 +8319,8 @@
         </p:nvSpPr>
         <p:spPr>
           <a:xfrm>
-            <a:off x="1371600" y="3733800"/>
-            <a:ext cx="1371600" cy="914400"/>
+            <a:off x="1524000" y="3974462"/>
+            <a:ext cx="1371600" cy="1066800"/>
           </a:xfrm>
           <a:prstGeom prst="ellipse">
             <a:avLst/>
@@ -9106,7 +9092,7 @@
           <a:p>
             <a:r>
               <a:rPr lang="en-US" sz="1800" dirty="0"/>
-              <a:t>Game development  is about team work (50% of grade from teamwork)</a:t>
+              <a:t>Game development  is about team work (40% of grade from teamwork)</a:t>
             </a:r>
           </a:p>
           <a:p>
@@ -10914,7 +10900,7 @@
                 <a:latin typeface="+mn-ea"/>
                 <a:cs typeface="FreesiaUPC" panose="020B0604020202020204" pitchFamily="34" charset="-34"/>
               </a:rPr>
-              <a:t>You need to form teams (of 5 or 6) ASAP</a:t>
+              <a:t>You need to form teams (of 4) ASAP</a:t>
             </a:r>
             <a:br>
               <a:rPr lang="en-US" altLang="zh-CN" dirty="0">
@@ -11679,7 +11665,7 @@
           <a:p>
             <a:r>
               <a:rPr lang="en-US" dirty="0"/>
-              <a:t>First thing: Team forming …</a:t>
+              <a:t>First thing: Team forming … (needs update)</a:t>
             </a:r>
           </a:p>
         </p:txBody>
@@ -11707,7 +11693,7 @@
           <a:p>
             <a:r>
               <a:rPr lang="en-US" dirty="0"/>
-              <a:t>Teams of 5 or 6 members: To Dos …</a:t>
+              <a:t>Teams of 4 members: To Dos …</a:t>
             </a:r>
           </a:p>
           <a:p>
@@ -11911,9 +11897,22 @@
               <a:buNone/>
             </a:pPr>
             <a:r>
-              <a:rPr lang="en-US" sz="3200" dirty="0"/>
-              <a:t>https://myuwbclasses.github.io/XJTU-IntroGameDev/</a:t>
-            </a:r>
+              <a:rPr lang="en-US" sz="3200" dirty="0">
+                <a:hlinkClick r:id="rId2"/>
+              </a:rPr>
+              <a:t>https://myuwbclasses.github.</a:t>
+            </a:r>
+            <a:r>
+              <a:rPr lang="en-US" sz="3200">
+                <a:hlinkClick r:id="rId2"/>
+              </a:rPr>
+              <a:t>io/IntroGameDev-XJTU/</a:t>
+            </a:r>
+            <a:r>
+              <a:rPr lang="en-US" sz="3200"/>
+              <a:t> </a:t>
+            </a:r>
+            <a:endParaRPr lang="en-US" sz="3200" dirty="0"/>
           </a:p>
         </p:txBody>
       </p:sp>
@@ -12000,7 +11999,7 @@
             <a:pPr lvl="1"/>
             <a:r>
               <a:rPr lang="en-US" altLang="zh-TW" dirty="0"/>
-              <a:t>For fun?  … FUN? 11 days with 32-contact hours!</a:t>
+              <a:t>For fun?  … FUN? 15 days with 32-contact hours!</a:t>
             </a:r>
           </a:p>
           <a:p>

</xml_diff>